<commit_message>
Added latest version for Posada Dev
Added ideas for testing after patching.
</commit_message>
<xml_diff>
--- a/2024-12-GDL-PosadaDev/posadadev.pptx
+++ b/2024-12-GDL-PosadaDev/posadadev.pptx
@@ -127,6 +127,11 @@
       </a:defRPr>
     </a:lvl9pPr>
   </p:defaultTextStyle>
+  <p:extLst>
+    <p:ext uri="{EFAFB233-063F-42B5-8137-9DF3F51BA10A}">
+      <p15:sldGuideLst xmlns:p15="http://schemas.microsoft.com/office/powerpoint/2012/main"/>
+    </p:ext>
+  </p:extLst>
 </p:presentation>
 </file>
 
@@ -5662,7 +5667,9 @@
         </p:nvSpPr>
         <p:spPr/>
         <p:txBody>
-          <a:bodyPr/>
+          <a:bodyPr>
+            <a:normAutofit fontScale="85000" lnSpcReduction="10000"/>
+          </a:bodyPr>
           <a:lstStyle/>
           <a:p>
             <a:r>
@@ -5720,6 +5727,16 @@
             <a:r>
               <a:rPr lang="en-US" dirty="0"/>
               <a:t>! - Check for issues in the PR. Take this shit seriously. Test in a clean environment. Follow the  CI/CD path and add unit testing as pre-requisite to accept the code. </a:t>
+            </a:r>
+          </a:p>
+          <a:p>
+            <a:r>
+              <a:rPr lang="en-US" b="1" dirty="0"/>
+              <a:t>Patch vulnerabilities </a:t>
+            </a:r>
+            <a:r>
+              <a:rPr lang="en-US" dirty="0"/>
+              <a:t>and test! – You might find that the ABI/API changed enough to break your project.</a:t>
             </a:r>
           </a:p>
           <a:p>

</xml_diff>